<commit_message>
added a presentaion power point
</commit_message>
<xml_diff>
--- a/powerpoint.pptx
+++ b/powerpoint.pptx
@@ -5,24 +5,23 @@
     <p:sldMasterId id="2147483648" r:id="rId4"/>
   </p:sldMasterIdLst>
   <p:notesMasterIdLst>
-    <p:notesMasterId r:id="rId17"/>
+    <p:notesMasterId r:id="rId16"/>
   </p:notesMasterIdLst>
   <p:handoutMasterIdLst>
-    <p:handoutMasterId r:id="rId18"/>
+    <p:handoutMasterId r:id="rId17"/>
   </p:handoutMasterIdLst>
   <p:sldIdLst>
     <p:sldId id="353" r:id="rId5"/>
-    <p:sldId id="357" r:id="rId6"/>
-    <p:sldId id="329" r:id="rId7"/>
-    <p:sldId id="354" r:id="rId8"/>
-    <p:sldId id="358" r:id="rId9"/>
-    <p:sldId id="359" r:id="rId10"/>
-    <p:sldId id="360" r:id="rId11"/>
-    <p:sldId id="361" r:id="rId12"/>
-    <p:sldId id="362" r:id="rId13"/>
-    <p:sldId id="331" r:id="rId14"/>
-    <p:sldId id="349" r:id="rId15"/>
-    <p:sldId id="356" r:id="rId16"/>
+    <p:sldId id="329" r:id="rId6"/>
+    <p:sldId id="354" r:id="rId7"/>
+    <p:sldId id="358" r:id="rId8"/>
+    <p:sldId id="359" r:id="rId9"/>
+    <p:sldId id="360" r:id="rId10"/>
+    <p:sldId id="361" r:id="rId11"/>
+    <p:sldId id="362" r:id="rId12"/>
+    <p:sldId id="363" r:id="rId13"/>
+    <p:sldId id="364" r:id="rId14"/>
+    <p:sldId id="356" r:id="rId15"/>
   </p:sldIdLst>
   <p:sldSz cx="12192000" cy="6858000"/>
   <p:notesSz cx="6858000" cy="9144000"/>
@@ -747,7 +746,7 @@
           <a:p>
             <a:fld id="{0775476F-A808-1F46-A368-07984F6DA22E}" type="slidenum">
               <a:rPr lang="en-US" smtClean="0"/>
-              <a:t>3</a:t>
+              <a:t>2</a:t>
             </a:fld>
             <a:endParaRPr lang="en-US" dirty="0"/>
           </a:p>
@@ -757,90 +756,6 @@
     <p:extLst>
       <p:ext uri="{BB962C8B-B14F-4D97-AF65-F5344CB8AC3E}">
         <p14:creationId xmlns:p14="http://schemas.microsoft.com/office/powerpoint/2010/main" val="3127910783"/>
-      </p:ext>
-    </p:extLst>
-  </p:cSld>
-  <p:clrMapOvr>
-    <a:masterClrMapping/>
-  </p:clrMapOvr>
-</p:notes>
-</file>
-
-<file path=ppt/notesSlides/notesSlide2.xml><?xml version="1.0" encoding="utf-8"?>
-<p:notes xmlns:a="http://schemas.openxmlformats.org/drawingml/2006/main" xmlns:r="http://schemas.openxmlformats.org/officeDocument/2006/relationships" xmlns:p="http://schemas.openxmlformats.org/presentationml/2006/main">
-  <p:cSld>
-    <p:spTree>
-      <p:nvGrpSpPr>
-        <p:cNvPr id="1" name=""/>
-        <p:cNvGrpSpPr/>
-        <p:nvPr/>
-      </p:nvGrpSpPr>
-      <p:grpSpPr>
-        <a:xfrm>
-          <a:off x="0" y="0"/>
-          <a:ext cx="0" cy="0"/>
-          <a:chOff x="0" y="0"/>
-          <a:chExt cx="0" cy="0"/>
-        </a:xfrm>
-      </p:grpSpPr>
-      <p:sp>
-        <p:nvSpPr>
-          <p:cNvPr id="2" name="Slide Image Placeholder 1"/>
-          <p:cNvSpPr>
-            <a:spLocks noGrp="1" noRot="1" noChangeAspect="1"/>
-          </p:cNvSpPr>
-          <p:nvPr>
-            <p:ph type="sldImg"/>
-          </p:nvPr>
-        </p:nvSpPr>
-        <p:spPr/>
-      </p:sp>
-      <p:sp>
-        <p:nvSpPr>
-          <p:cNvPr id="3" name="Notes Placeholder 2"/>
-          <p:cNvSpPr>
-            <a:spLocks noGrp="1"/>
-          </p:cNvSpPr>
-          <p:nvPr>
-            <p:ph type="body" idx="1"/>
-          </p:nvPr>
-        </p:nvSpPr>
-        <p:spPr/>
-        <p:txBody>
-          <a:bodyPr/>
-          <a:lstStyle/>
-          <a:p>
-            <a:endParaRPr lang="en-US" dirty="0"/>
-          </a:p>
-        </p:txBody>
-      </p:sp>
-      <p:sp>
-        <p:nvSpPr>
-          <p:cNvPr id="4" name="Slide Number Placeholder 3"/>
-          <p:cNvSpPr>
-            <a:spLocks noGrp="1"/>
-          </p:cNvSpPr>
-          <p:nvPr>
-            <p:ph type="sldNum" sz="quarter" idx="5"/>
-          </p:nvPr>
-        </p:nvSpPr>
-        <p:spPr/>
-        <p:txBody>
-          <a:bodyPr/>
-          <a:lstStyle/>
-          <a:p>
-            <a:fld id="{0775476F-A808-1F46-A368-07984F6DA22E}" type="slidenum">
-              <a:rPr lang="en-US" smtClean="0"/>
-              <a:t>10</a:t>
-            </a:fld>
-            <a:endParaRPr lang="en-US" dirty="0"/>
-          </a:p>
-        </p:txBody>
-      </p:sp>
-    </p:spTree>
-    <p:extLst>
-      <p:ext uri="{BB962C8B-B14F-4D97-AF65-F5344CB8AC3E}">
-        <p14:creationId xmlns:p14="http://schemas.microsoft.com/office/powerpoint/2010/main" val="3237519860"/>
       </p:ext>
     </p:extLst>
   </p:cSld>
@@ -6893,7 +6808,13 @@
   <p:cSld>
     <p:spTree>
       <p:nvGrpSpPr>
-        <p:cNvPr id="1" name=""/>
+        <p:cNvPr id="1" name="">
+          <a:extLst>
+            <a:ext uri="{FF2B5EF4-FFF2-40B4-BE49-F238E27FC236}">
+              <a16:creationId xmlns:a16="http://schemas.microsoft.com/office/drawing/2014/main" id="{C17A53FB-39FA-C409-AED1-4AED3562C3ED}"/>
+            </a:ext>
+          </a:extLst>
+        </p:cNvPr>
         <p:cNvGrpSpPr/>
         <p:nvPr/>
       </p:nvGrpSpPr>
@@ -6905,12 +6826,45 @@
           <a:chExt cx="0" cy="0"/>
         </a:xfrm>
       </p:grpSpPr>
-      <p:sp>
-        <p:nvSpPr>
-          <p:cNvPr id="2" name="Title 1">
-            <a:extLst>
-              <a:ext uri="{FF2B5EF4-FFF2-40B4-BE49-F238E27FC236}">
-                <a16:creationId xmlns:a16="http://schemas.microsoft.com/office/drawing/2014/main" id="{954ABE40-AA00-F366-A36A-B3F1AADBF025}"/>
+      <p:pic>
+        <p:nvPicPr>
+          <p:cNvPr id="5" name="Picture Placeholder 4">
+            <a:extLst>
+              <a:ext uri="{FF2B5EF4-FFF2-40B4-BE49-F238E27FC236}">
+                <a16:creationId xmlns:a16="http://schemas.microsoft.com/office/drawing/2014/main" id="{B69F625A-533A-D0D3-44CE-1789B66E1FE9}"/>
+              </a:ext>
+            </a:extLst>
+          </p:cNvPr>
+          <p:cNvPicPr>
+            <a:picLocks noGrp="1" noChangeAspect="1"/>
+          </p:cNvPicPr>
+          <p:nvPr>
+            <p:ph type="pic" sz="quarter" idx="10"/>
+          </p:nvPr>
+        </p:nvPicPr>
+        <p:blipFill>
+          <a:blip r:embed="rId2"/>
+          <a:srcRect/>
+          <a:stretch/>
+        </p:blipFill>
+        <p:spPr>
+          <a:xfrm>
+            <a:off x="0" y="0"/>
+            <a:ext cx="12192000" cy="6858000"/>
+          </a:xfrm>
+          <a:solidFill>
+            <a:schemeClr val="bg1">
+              <a:lumMod val="95000"/>
+            </a:schemeClr>
+          </a:solidFill>
+        </p:spPr>
+      </p:pic>
+      <p:sp>
+        <p:nvSpPr>
+          <p:cNvPr id="7" name="Title 6">
+            <a:extLst>
+              <a:ext uri="{FF2B5EF4-FFF2-40B4-BE49-F238E27FC236}">
+                <a16:creationId xmlns:a16="http://schemas.microsoft.com/office/drawing/2014/main" id="{12565EE5-4387-291D-5BDE-034602A8ECF2}"/>
               </a:ext>
             </a:extLst>
           </p:cNvPr>
@@ -6918,32 +6872,32 @@
             <a:spLocks noGrp="1"/>
           </p:cNvSpPr>
           <p:nvPr>
-            <p:ph type="title"/>
+            <p:ph type="ctrTitle"/>
           </p:nvPr>
         </p:nvSpPr>
         <p:spPr>
           <a:xfrm>
-            <a:off x="621792" y="722376"/>
-            <a:ext cx="6419088" cy="2350008"/>
-          </a:xfrm>
-          <a:noFill/>
-        </p:spPr>
-        <p:txBody>
-          <a:bodyPr>
-            <a:noAutofit/>
-          </a:bodyPr>
+            <a:off x="1527048" y="2276856"/>
+            <a:ext cx="9144000" cy="1508760"/>
+          </a:xfrm>
+        </p:spPr>
+        <p:txBody>
+          <a:bodyPr/>
           <a:lstStyle/>
           <a:p>
-            <a:endParaRPr lang="en-US" dirty="0"/>
-          </a:p>
-        </p:txBody>
-      </p:sp>
-      <p:sp>
-        <p:nvSpPr>
-          <p:cNvPr id="3" name="Subtitle 2">
-            <a:extLst>
-              <a:ext uri="{FF2B5EF4-FFF2-40B4-BE49-F238E27FC236}">
-                <a16:creationId xmlns:a16="http://schemas.microsoft.com/office/drawing/2014/main" id="{72446868-83F0-CEEF-5E60-6D55C93B523F}"/>
+            <a:r>
+              <a:rPr lang="en-US" dirty="0"/>
+              <a:t>Selecting visual aids</a:t>
+            </a:r>
+          </a:p>
+        </p:txBody>
+      </p:sp>
+      <p:sp>
+        <p:nvSpPr>
+          <p:cNvPr id="8" name="Subtitle 7">
+            <a:extLst>
+              <a:ext uri="{FF2B5EF4-FFF2-40B4-BE49-F238E27FC236}">
+                <a16:creationId xmlns:a16="http://schemas.microsoft.com/office/drawing/2014/main" id="{3D9F085B-CB0A-A736-32FB-E77461069F6B}"/>
               </a:ext>
             </a:extLst>
           </p:cNvPr>
@@ -6956,56 +6910,176 @@
         </p:nvSpPr>
         <p:spPr>
           <a:xfrm>
-            <a:off x="640079" y="3931920"/>
-            <a:ext cx="6419088" cy="1389888"/>
-          </a:xfrm>
-          <a:noFill/>
+            <a:off x="1527048" y="3858768"/>
+            <a:ext cx="9144000" cy="841248"/>
+          </a:xfrm>
         </p:spPr>
         <p:txBody>
           <a:bodyPr/>
           <a:lstStyle/>
           <a:p>
+            <a:r>
+              <a:rPr lang="en-US" dirty="0"/>
+              <a:t>Enhancing your presentation</a:t>
+            </a:r>
+          </a:p>
+        </p:txBody>
+      </p:sp>
+      <p:sp>
+        <p:nvSpPr>
+          <p:cNvPr id="12" name="Plaque 11">
+            <a:extLst>
+              <a:ext uri="{FF2B5EF4-FFF2-40B4-BE49-F238E27FC236}">
+                <a16:creationId xmlns:a16="http://schemas.microsoft.com/office/drawing/2014/main" id="{B4DFBC61-1564-CA20-F296-3FFE590F3BD7}"/>
+              </a:ext>
+              <a:ext uri="{C183D7F6-B498-43B3-948B-1728B52AA6E4}">
+                <adec:decorative xmlns:adec="http://schemas.microsoft.com/office/drawing/2017/decorative" val="1"/>
+              </a:ext>
+            </a:extLst>
+          </p:cNvPr>
+          <p:cNvSpPr/>
+          <p:nvPr/>
+        </p:nvSpPr>
+        <p:spPr>
+          <a:xfrm>
+            <a:off x="1332854" y="1782305"/>
+            <a:ext cx="9546956" cy="3270142"/>
+          </a:xfrm>
+          <a:prstGeom prst="plaque">
+            <a:avLst>
+              <a:gd name="adj" fmla="val 7602"/>
+            </a:avLst>
+          </a:prstGeom>
+          <a:noFill/>
+          <a:ln>
+            <a:solidFill>
+              <a:schemeClr val="accent5"/>
+            </a:solidFill>
+          </a:ln>
+        </p:spPr>
+        <p:style>
+          <a:lnRef idx="2">
+            <a:schemeClr val="accent1">
+              <a:shade val="15000"/>
+            </a:schemeClr>
+          </a:lnRef>
+          <a:fillRef idx="1">
+            <a:schemeClr val="accent1"/>
+          </a:fillRef>
+          <a:effectRef idx="0">
+            <a:schemeClr val="accent1"/>
+          </a:effectRef>
+          <a:fontRef idx="minor">
+            <a:schemeClr val="lt1"/>
+          </a:fontRef>
+        </p:style>
+        <p:txBody>
+          <a:bodyPr rtlCol="0" anchor="ctr"/>
+          <a:lstStyle/>
+          <a:p>
+            <a:pPr algn="ctr"/>
             <a:endParaRPr lang="en-US" dirty="0"/>
           </a:p>
         </p:txBody>
       </p:sp>
+      <p:cxnSp>
+        <p:nvCxnSpPr>
+          <p:cNvPr id="13" name="Straight Connector 12">
+            <a:extLst>
+              <a:ext uri="{FF2B5EF4-FFF2-40B4-BE49-F238E27FC236}">
+                <a16:creationId xmlns:a16="http://schemas.microsoft.com/office/drawing/2014/main" id="{4CF85587-2402-944A-D661-F5C4EB8FE9F1}"/>
+              </a:ext>
+              <a:ext uri="{C183D7F6-B498-43B3-948B-1728B52AA6E4}">
+                <adec:decorative xmlns:adec="http://schemas.microsoft.com/office/drawing/2017/decorative" val="1"/>
+              </a:ext>
+            </a:extLst>
+          </p:cNvPr>
+          <p:cNvCxnSpPr>
+            <a:cxnSpLocks/>
+          </p:cNvCxnSpPr>
+          <p:nvPr/>
+        </p:nvCxnSpPr>
+        <p:spPr>
+          <a:xfrm>
+            <a:off x="3433949" y="3605726"/>
+            <a:ext cx="5321300" cy="0"/>
+          </a:xfrm>
+          <a:prstGeom prst="line">
+            <a:avLst/>
+          </a:prstGeom>
+          <a:ln w="12700">
+            <a:solidFill>
+              <a:schemeClr val="accent5"/>
+            </a:solidFill>
+          </a:ln>
+        </p:spPr>
+        <p:style>
+          <a:lnRef idx="1">
+            <a:schemeClr val="accent1"/>
+          </a:lnRef>
+          <a:fillRef idx="0">
+            <a:schemeClr val="accent1"/>
+          </a:fillRef>
+          <a:effectRef idx="0">
+            <a:schemeClr val="accent1"/>
+          </a:effectRef>
+          <a:fontRef idx="minor">
+            <a:schemeClr val="tx1"/>
+          </a:fontRef>
+        </p:style>
+      </p:cxnSp>
       <p:pic>
         <p:nvPicPr>
-          <p:cNvPr id="9" name="Picture Placeholder 5">
-            <a:extLst>
-              <a:ext uri="{FF2B5EF4-FFF2-40B4-BE49-F238E27FC236}">
-                <a16:creationId xmlns:a16="http://schemas.microsoft.com/office/drawing/2014/main" id="{B0E612D5-D631-0C31-BE9E-287392433299}"/>
+          <p:cNvPr id="14" name="Picture 13">
+            <a:extLst>
+              <a:ext uri="{FF2B5EF4-FFF2-40B4-BE49-F238E27FC236}">
+                <a16:creationId xmlns:a16="http://schemas.microsoft.com/office/drawing/2014/main" id="{9A970C8D-5C17-2E69-74D2-5E3F6A305F0D}"/>
+              </a:ext>
+              <a:ext uri="{C183D7F6-B498-43B3-948B-1728B52AA6E4}">
+                <adec:decorative xmlns:adec="http://schemas.microsoft.com/office/drawing/2017/decorative" val="1"/>
               </a:ext>
             </a:extLst>
           </p:cNvPr>
           <p:cNvPicPr>
-            <a:picLocks noGrp="1" noChangeAspect="1"/>
+            <a:picLocks noChangeAspect="1"/>
           </p:cNvPicPr>
-          <p:nvPr>
-            <p:ph type="pic" sz="quarter" idx="13"/>
-          </p:nvPr>
+          <p:nvPr/>
         </p:nvPicPr>
         <p:blipFill>
-          <a:blip r:embed="rId3"/>
-          <a:srcRect/>
-          <a:stretch/>
+          <a:blip r:embed="rId3" cstate="screen">
+            <a:extLst>
+              <a:ext uri="{BEBA8EAE-BF5A-486C-A8C5-ECC9F3942E4B}">
+                <a14:imgProps xmlns:a14="http://schemas.microsoft.com/office/drawing/2010/main">
+                  <a14:imgLayer r:embed="rId4">
+                    <a14:imgEffect>
+                      <a14:saturation sat="35000"/>
+                    </a14:imgEffect>
+                  </a14:imgLayer>
+                </a14:imgProps>
+              </a:ext>
+              <a:ext uri="{28A0092B-C50C-407E-A947-70E740481C1C}">
+                <a14:useLocalDpi xmlns:a14="http://schemas.microsoft.com/office/drawing/2010/main"/>
+              </a:ext>
+            </a:extLst>
+          </a:blip>
+          <a:stretch>
+            <a:fillRect/>
+          </a:stretch>
         </p:blipFill>
         <p:spPr>
           <a:xfrm>
-            <a:off x="7239000" y="0"/>
-            <a:ext cx="4949952" cy="6858000"/>
-          </a:xfrm>
-          <a:solidFill>
-            <a:schemeClr val="bg1">
-              <a:lumMod val="95000"/>
-            </a:schemeClr>
-          </a:solidFill>
+            <a:off x="5608560" y="3464902"/>
+            <a:ext cx="972078" cy="285381"/>
+          </a:xfrm>
+          <a:prstGeom prst="rect">
+            <a:avLst/>
+          </a:prstGeom>
         </p:spPr>
       </p:pic>
     </p:spTree>
     <p:extLst>
       <p:ext uri="{BB962C8B-B14F-4D97-AF65-F5344CB8AC3E}">
-        <p14:creationId xmlns:p14="http://schemas.microsoft.com/office/powerpoint/2010/main" val="3541873986"/>
+        <p14:creationId xmlns:p14="http://schemas.microsoft.com/office/powerpoint/2010/main" val="1299202918"/>
       </p:ext>
     </p:extLst>
   </p:cSld>
@@ -7032,192 +7106,6 @@
           <a:chExt cx="0" cy="0"/>
         </a:xfrm>
       </p:grpSpPr>
-      <p:sp>
-        <p:nvSpPr>
-          <p:cNvPr id="6" name="Title 5">
-            <a:extLst>
-              <a:ext uri="{FF2B5EF4-FFF2-40B4-BE49-F238E27FC236}">
-                <a16:creationId xmlns:a16="http://schemas.microsoft.com/office/drawing/2014/main" id="{2057FFDB-DFEC-7174-F23F-20C423A03C6A}"/>
-              </a:ext>
-            </a:extLst>
-          </p:cNvPr>
-          <p:cNvSpPr>
-            <a:spLocks noGrp="1"/>
-          </p:cNvSpPr>
-          <p:nvPr>
-            <p:ph type="title"/>
-          </p:nvPr>
-        </p:nvSpPr>
-        <p:spPr>
-          <a:xfrm>
-            <a:off x="5193792" y="557784"/>
-            <a:ext cx="6419088" cy="1929384"/>
-          </a:xfrm>
-        </p:spPr>
-        <p:txBody>
-          <a:bodyPr/>
-          <a:lstStyle/>
-          <a:p>
-            <a:endParaRPr lang="en-US" dirty="0"/>
-          </a:p>
-        </p:txBody>
-      </p:sp>
-      <p:pic>
-        <p:nvPicPr>
-          <p:cNvPr id="8" name="Picture Placeholder 7">
-            <a:extLst>
-              <a:ext uri="{FF2B5EF4-FFF2-40B4-BE49-F238E27FC236}">
-                <a16:creationId xmlns:a16="http://schemas.microsoft.com/office/drawing/2014/main" id="{A30CECCA-DB43-3EBC-1ED9-4E7CD74EE3E3}"/>
-              </a:ext>
-            </a:extLst>
-          </p:cNvPr>
-          <p:cNvPicPr>
-            <a:picLocks noGrp="1" noChangeAspect="1"/>
-          </p:cNvPicPr>
-          <p:nvPr>
-            <p:ph type="pic" sz="quarter" idx="13"/>
-          </p:nvPr>
-        </p:nvPicPr>
-        <p:blipFill>
-          <a:blip r:embed="rId2"/>
-          <a:srcRect/>
-          <a:stretch/>
-        </p:blipFill>
-        <p:spPr>
-          <a:xfrm>
-            <a:off x="0" y="0"/>
-            <a:ext cx="4434464" cy="6858000"/>
-          </a:xfrm>
-        </p:spPr>
-      </p:pic>
-      <p:sp>
-        <p:nvSpPr>
-          <p:cNvPr id="4" name="Content Placeholder 3">
-            <a:extLst>
-              <a:ext uri="{FF2B5EF4-FFF2-40B4-BE49-F238E27FC236}">
-                <a16:creationId xmlns:a16="http://schemas.microsoft.com/office/drawing/2014/main" id="{D6F3EE20-53E0-0C62-809D-211B05B88043}"/>
-              </a:ext>
-            </a:extLst>
-          </p:cNvPr>
-          <p:cNvSpPr>
-            <a:spLocks noGrp="1"/>
-          </p:cNvSpPr>
-          <p:nvPr>
-            <p:ph sz="quarter" idx="12"/>
-          </p:nvPr>
-        </p:nvSpPr>
-        <p:spPr>
-          <a:xfrm>
-            <a:off x="5193792" y="3328416"/>
-            <a:ext cx="6419088" cy="2441448"/>
-          </a:xfrm>
-        </p:spPr>
-        <p:txBody>
-          <a:bodyPr/>
-          <a:lstStyle/>
-          <a:p>
-            <a:endParaRPr lang="en-US" dirty="0"/>
-          </a:p>
-        </p:txBody>
-      </p:sp>
-      <p:sp>
-        <p:nvSpPr>
-          <p:cNvPr id="2" name="Footer Placeholder 1">
-            <a:extLst>
-              <a:ext uri="{FF2B5EF4-FFF2-40B4-BE49-F238E27FC236}">
-                <a16:creationId xmlns:a16="http://schemas.microsoft.com/office/drawing/2014/main" id="{0BF157F0-FCC9-135B-D7C0-66741C62659A}"/>
-              </a:ext>
-            </a:extLst>
-          </p:cNvPr>
-          <p:cNvSpPr>
-            <a:spLocks noGrp="1"/>
-          </p:cNvSpPr>
-          <p:nvPr>
-            <p:ph type="ftr" sz="quarter" idx="10"/>
-          </p:nvPr>
-        </p:nvSpPr>
-        <p:spPr>
-          <a:xfrm>
-            <a:off x="5193792" y="6356350"/>
-            <a:ext cx="4114800" cy="365125"/>
-          </a:xfrm>
-        </p:spPr>
-        <p:txBody>
-          <a:bodyPr/>
-          <a:lstStyle/>
-          <a:p>
-            <a:r>
-              <a:rPr lang="en-US" dirty="0"/>
-              <a:t>Presentation title</a:t>
-            </a:r>
-          </a:p>
-        </p:txBody>
-      </p:sp>
-      <p:sp>
-        <p:nvSpPr>
-          <p:cNvPr id="3" name="Slide Number Placeholder 2">
-            <a:extLst>
-              <a:ext uri="{FF2B5EF4-FFF2-40B4-BE49-F238E27FC236}">
-                <a16:creationId xmlns:a16="http://schemas.microsoft.com/office/drawing/2014/main" id="{B8F090ED-AB65-F860-A6D0-5F6E60E175E5}"/>
-              </a:ext>
-            </a:extLst>
-          </p:cNvPr>
-          <p:cNvSpPr>
-            <a:spLocks noGrp="1"/>
-          </p:cNvSpPr>
-          <p:nvPr>
-            <p:ph type="sldNum" sz="quarter" idx="11"/>
-          </p:nvPr>
-        </p:nvSpPr>
-        <p:spPr>
-          <a:xfrm>
-            <a:off x="10635996" y="6356350"/>
-            <a:ext cx="784860" cy="365125"/>
-          </a:xfrm>
-        </p:spPr>
-        <p:txBody>
-          <a:bodyPr/>
-          <a:lstStyle/>
-          <a:p>
-            <a:fld id="{294A09A9-5501-47C1-A89A-A340965A2BE2}" type="slidenum">
-              <a:rPr lang="en-US" smtClean="0"/>
-              <a:pPr/>
-              <a:t>11</a:t>
-            </a:fld>
-            <a:endParaRPr lang="en-US" dirty="0"/>
-          </a:p>
-        </p:txBody>
-      </p:sp>
-    </p:spTree>
-    <p:extLst>
-      <p:ext uri="{BB962C8B-B14F-4D97-AF65-F5344CB8AC3E}">
-        <p14:creationId xmlns:p14="http://schemas.microsoft.com/office/powerpoint/2010/main" val="2069428662"/>
-      </p:ext>
-    </p:extLst>
-  </p:cSld>
-  <p:clrMapOvr>
-    <a:masterClrMapping/>
-  </p:clrMapOvr>
-</p:sld>
-</file>
-
-<file path=ppt/slides/slide12.xml><?xml version="1.0" encoding="utf-8"?>
-<p:sld xmlns:a="http://schemas.openxmlformats.org/drawingml/2006/main" xmlns:r="http://schemas.openxmlformats.org/officeDocument/2006/relationships" xmlns:p="http://schemas.openxmlformats.org/presentationml/2006/main">
-  <p:cSld>
-    <p:spTree>
-      <p:nvGrpSpPr>
-        <p:cNvPr id="1" name=""/>
-        <p:cNvGrpSpPr/>
-        <p:nvPr/>
-      </p:nvGrpSpPr>
-      <p:grpSpPr>
-        <a:xfrm>
-          <a:off x="0" y="0"/>
-          <a:ext cx="0" cy="0"/>
-          <a:chOff x="0" y="0"/>
-          <a:chExt cx="0" cy="0"/>
-        </a:xfrm>
-      </p:grpSpPr>
       <p:pic>
         <p:nvPicPr>
           <p:cNvPr id="12" name="Picture Placeholder 11">
@@ -7419,294 +7307,6 @@
 </file>
 
 <file path=ppt/slides/slide2.xml><?xml version="1.0" encoding="utf-8"?>
-<p:sld xmlns:a="http://schemas.openxmlformats.org/drawingml/2006/main" xmlns:r="http://schemas.openxmlformats.org/officeDocument/2006/relationships" xmlns:p="http://schemas.openxmlformats.org/presentationml/2006/main">
-  <p:cSld>
-    <p:spTree>
-      <p:nvGrpSpPr>
-        <p:cNvPr id="1" name="">
-          <a:extLst>
-            <a:ext uri="{FF2B5EF4-FFF2-40B4-BE49-F238E27FC236}">
-              <a16:creationId xmlns:a16="http://schemas.microsoft.com/office/drawing/2014/main" id="{A38FB805-23BF-0E99-3427-C0AF2E267D54}"/>
-            </a:ext>
-          </a:extLst>
-        </p:cNvPr>
-        <p:cNvGrpSpPr/>
-        <p:nvPr/>
-      </p:nvGrpSpPr>
-      <p:grpSpPr>
-        <a:xfrm>
-          <a:off x="0" y="0"/>
-          <a:ext cx="0" cy="0"/>
-          <a:chOff x="0" y="0"/>
-          <a:chExt cx="0" cy="0"/>
-        </a:xfrm>
-      </p:grpSpPr>
-      <p:pic>
-        <p:nvPicPr>
-          <p:cNvPr id="5" name="Picture Placeholder 4">
-            <a:extLst>
-              <a:ext uri="{FF2B5EF4-FFF2-40B4-BE49-F238E27FC236}">
-                <a16:creationId xmlns:a16="http://schemas.microsoft.com/office/drawing/2014/main" id="{1E05BCBE-44DA-94DE-E1A2-02E385361429}"/>
-              </a:ext>
-            </a:extLst>
-          </p:cNvPr>
-          <p:cNvPicPr>
-            <a:picLocks noGrp="1" noChangeAspect="1"/>
-          </p:cNvPicPr>
-          <p:nvPr>
-            <p:ph type="pic" sz="quarter" idx="10"/>
-          </p:nvPr>
-        </p:nvPicPr>
-        <p:blipFill>
-          <a:blip r:embed="rId2"/>
-          <a:srcRect/>
-          <a:stretch/>
-        </p:blipFill>
-        <p:spPr>
-          <a:xfrm>
-            <a:off x="-341644" y="-1"/>
-            <a:ext cx="12533644" cy="7455877"/>
-          </a:xfrm>
-        </p:spPr>
-      </p:pic>
-      <p:sp>
-        <p:nvSpPr>
-          <p:cNvPr id="3" name="Title 2">
-            <a:extLst>
-              <a:ext uri="{FF2B5EF4-FFF2-40B4-BE49-F238E27FC236}">
-                <a16:creationId xmlns:a16="http://schemas.microsoft.com/office/drawing/2014/main" id="{AC5503AE-0094-20D2-92C0-D61ED89448AD}"/>
-              </a:ext>
-            </a:extLst>
-          </p:cNvPr>
-          <p:cNvSpPr>
-            <a:spLocks noGrp="1"/>
-          </p:cNvSpPr>
-          <p:nvPr>
-            <p:ph type="ctrTitle"/>
-          </p:nvPr>
-        </p:nvSpPr>
-        <p:spPr>
-          <a:xfrm>
-            <a:off x="100076" y="1412240"/>
-            <a:ext cx="6327648" cy="2180543"/>
-          </a:xfrm>
-        </p:spPr>
-        <p:txBody>
-          <a:bodyPr/>
-          <a:lstStyle/>
-          <a:p>
-            <a:r>
-              <a:rPr lang="en-US" dirty="0"/>
-              <a:t>Master </a:t>
-            </a:r>
-            <a:br>
-              <a:rPr lang="en-US" dirty="0"/>
-            </a:br>
-            <a:r>
-              <a:rPr lang="en-US" dirty="0"/>
-              <a:t>public speaking</a:t>
-            </a:r>
-          </a:p>
-        </p:txBody>
-      </p:sp>
-      <p:sp>
-        <p:nvSpPr>
-          <p:cNvPr id="4" name="Subtitle 3">
-            <a:extLst>
-              <a:ext uri="{FF2B5EF4-FFF2-40B4-BE49-F238E27FC236}">
-                <a16:creationId xmlns:a16="http://schemas.microsoft.com/office/drawing/2014/main" id="{13B685F7-CDBF-99F9-7E45-1335D146841A}"/>
-              </a:ext>
-            </a:extLst>
-          </p:cNvPr>
-          <p:cNvSpPr>
-            <a:spLocks noGrp="1"/>
-          </p:cNvSpPr>
-          <p:nvPr>
-            <p:ph type="subTitle" idx="1"/>
-          </p:nvPr>
-        </p:nvSpPr>
-        <p:spPr>
-          <a:xfrm>
-            <a:off x="1911096" y="4254500"/>
-            <a:ext cx="3981704" cy="565832"/>
-          </a:xfrm>
-        </p:spPr>
-        <p:txBody>
-          <a:bodyPr/>
-          <a:lstStyle/>
-          <a:p>
-            <a:r>
-              <a:rPr lang="en-US" dirty="0"/>
-              <a:t>Mirjam Nilsson​</a:t>
-            </a:r>
-          </a:p>
-        </p:txBody>
-      </p:sp>
-      <p:cxnSp>
-        <p:nvCxnSpPr>
-          <p:cNvPr id="12" name="Straight Connector 11">
-            <a:extLst>
-              <a:ext uri="{FF2B5EF4-FFF2-40B4-BE49-F238E27FC236}">
-                <a16:creationId xmlns:a16="http://schemas.microsoft.com/office/drawing/2014/main" id="{7E9FD66B-91B9-E83C-DD09-E69F03637480}"/>
-              </a:ext>
-              <a:ext uri="{C183D7F6-B498-43B3-948B-1728B52AA6E4}">
-                <adec:decorative xmlns:adec="http://schemas.microsoft.com/office/drawing/2017/decorative" val="1"/>
-              </a:ext>
-            </a:extLst>
-          </p:cNvPr>
-          <p:cNvCxnSpPr>
-            <a:cxnSpLocks/>
-          </p:cNvCxnSpPr>
-          <p:nvPr/>
-        </p:nvCxnSpPr>
-        <p:spPr>
-          <a:xfrm>
-            <a:off x="886417" y="3695700"/>
-            <a:ext cx="5321300" cy="0"/>
-          </a:xfrm>
-          <a:prstGeom prst="line">
-            <a:avLst/>
-          </a:prstGeom>
-          <a:ln w="12700">
-            <a:solidFill>
-              <a:schemeClr val="accent5"/>
-            </a:solidFill>
-          </a:ln>
-        </p:spPr>
-        <p:style>
-          <a:lnRef idx="1">
-            <a:schemeClr val="accent1"/>
-          </a:lnRef>
-          <a:fillRef idx="0">
-            <a:schemeClr val="accent1"/>
-          </a:fillRef>
-          <a:effectRef idx="0">
-            <a:schemeClr val="accent1"/>
-          </a:effectRef>
-          <a:fontRef idx="minor">
-            <a:schemeClr val="tx1"/>
-          </a:fontRef>
-        </p:style>
-      </p:cxnSp>
-      <p:sp>
-        <p:nvSpPr>
-          <p:cNvPr id="13" name="Plaque 12">
-            <a:extLst>
-              <a:ext uri="{FF2B5EF4-FFF2-40B4-BE49-F238E27FC236}">
-                <a16:creationId xmlns:a16="http://schemas.microsoft.com/office/drawing/2014/main" id="{809DB50A-9B18-F07B-3246-3875A5114F12}"/>
-              </a:ext>
-              <a:ext uri="{C183D7F6-B498-43B3-948B-1728B52AA6E4}">
-                <adec:decorative xmlns:adec="http://schemas.microsoft.com/office/drawing/2017/decorative" val="1"/>
-              </a:ext>
-            </a:extLst>
-          </p:cNvPr>
-          <p:cNvSpPr/>
-          <p:nvPr/>
-        </p:nvSpPr>
-        <p:spPr>
-          <a:xfrm>
-            <a:off x="-110533" y="1409276"/>
-            <a:ext cx="6781800" cy="4889924"/>
-          </a:xfrm>
-          <a:prstGeom prst="plaque">
-            <a:avLst>
-              <a:gd name="adj" fmla="val 7602"/>
-            </a:avLst>
-          </a:prstGeom>
-          <a:noFill/>
-          <a:ln>
-            <a:solidFill>
-              <a:schemeClr val="accent5"/>
-            </a:solidFill>
-          </a:ln>
-        </p:spPr>
-        <p:style>
-          <a:lnRef idx="2">
-            <a:schemeClr val="accent1">
-              <a:shade val="15000"/>
-            </a:schemeClr>
-          </a:lnRef>
-          <a:fillRef idx="1">
-            <a:schemeClr val="accent1"/>
-          </a:fillRef>
-          <a:effectRef idx="0">
-            <a:schemeClr val="accent1"/>
-          </a:effectRef>
-          <a:fontRef idx="minor">
-            <a:schemeClr val="lt1"/>
-          </a:fontRef>
-        </p:style>
-        <p:txBody>
-          <a:bodyPr rtlCol="0" anchor="ctr"/>
-          <a:lstStyle/>
-          <a:p>
-            <a:pPr algn="ctr"/>
-            <a:endParaRPr lang="en-US" dirty="0"/>
-          </a:p>
-        </p:txBody>
-      </p:sp>
-      <p:pic>
-        <p:nvPicPr>
-          <p:cNvPr id="14" name="Picture 13">
-            <a:extLst>
-              <a:ext uri="{FF2B5EF4-FFF2-40B4-BE49-F238E27FC236}">
-                <a16:creationId xmlns:a16="http://schemas.microsoft.com/office/drawing/2014/main" id="{A2200911-246E-3DEF-CE03-8EDB48328771}"/>
-              </a:ext>
-              <a:ext uri="{C183D7F6-B498-43B3-948B-1728B52AA6E4}">
-                <adec:decorative xmlns:adec="http://schemas.microsoft.com/office/drawing/2017/decorative" val="1"/>
-              </a:ext>
-            </a:extLst>
-          </p:cNvPr>
-          <p:cNvPicPr>
-            <a:picLocks noChangeAspect="1"/>
-          </p:cNvPicPr>
-          <p:nvPr/>
-        </p:nvPicPr>
-        <p:blipFill>
-          <a:blip r:embed="rId3" cstate="screen">
-            <a:extLst>
-              <a:ext uri="{BEBA8EAE-BF5A-486C-A8C5-ECC9F3942E4B}">
-                <a14:imgProps xmlns:a14="http://schemas.microsoft.com/office/drawing/2010/main">
-                  <a14:imgLayer r:embed="rId4">
-                    <a14:imgEffect>
-                      <a14:saturation sat="35000"/>
-                    </a14:imgEffect>
-                  </a14:imgLayer>
-                </a14:imgProps>
-              </a:ext>
-              <a:ext uri="{28A0092B-C50C-407E-A947-70E740481C1C}">
-                <a14:useLocalDpi xmlns:a14="http://schemas.microsoft.com/office/drawing/2010/main"/>
-              </a:ext>
-            </a:extLst>
-          </a:blip>
-          <a:stretch>
-            <a:fillRect/>
-          </a:stretch>
-        </p:blipFill>
-        <p:spPr>
-          <a:xfrm>
-            <a:off x="2845128" y="3554876"/>
-            <a:ext cx="972078" cy="285381"/>
-          </a:xfrm>
-          <a:prstGeom prst="rect">
-            <a:avLst/>
-          </a:prstGeom>
-        </p:spPr>
-      </p:pic>
-    </p:spTree>
-    <p:extLst>
-      <p:ext uri="{BB962C8B-B14F-4D97-AF65-F5344CB8AC3E}">
-        <p14:creationId xmlns:p14="http://schemas.microsoft.com/office/powerpoint/2010/main" val="650569727"/>
-      </p:ext>
-    </p:extLst>
-  </p:cSld>
-  <p:clrMapOvr>
-    <a:masterClrMapping/>
-  </p:clrMapOvr>
-</p:sld>
-</file>
-
-<file path=ppt/slides/slide3.xml><?xml version="1.0" encoding="utf-8"?>
 <p:sld xmlns:a="http://schemas.openxmlformats.org/drawingml/2006/main" xmlns:r="http://schemas.openxmlformats.org/officeDocument/2006/relationships" xmlns:p="http://schemas.openxmlformats.org/presentationml/2006/main">
   <p:cSld>
     <p:bg>
@@ -7878,7 +7478,7 @@
           <a:p>
             <a:fld id="{294A09A9-5501-47C1-A89A-A340965A2BE2}" type="slidenum">
               <a:rPr lang="en-US" smtClean="0"/>
-              <a:t>3</a:t>
+              <a:t>2</a:t>
             </a:fld>
             <a:endParaRPr lang="en-US" dirty="0"/>
           </a:p>
@@ -7897,7 +7497,7 @@
 </p:sld>
 </file>
 
-<file path=ppt/slides/slide4.xml><?xml version="1.0" encoding="utf-8"?>
+<file path=ppt/slides/slide3.xml><?xml version="1.0" encoding="utf-8"?>
 <p:sld xmlns:a="http://schemas.openxmlformats.org/drawingml/2006/main" xmlns:r="http://schemas.openxmlformats.org/officeDocument/2006/relationships" xmlns:p="http://schemas.openxmlformats.org/presentationml/2006/main">
   <p:cSld>
     <p:spTree>
@@ -8057,7 +7657,7 @@
             <a:fld id="{294A09A9-5501-47C1-A89A-A340965A2BE2}" type="slidenum">
               <a:rPr lang="en-US" smtClean="0"/>
               <a:pPr/>
-              <a:t>4</a:t>
+              <a:t>3</a:t>
             </a:fld>
             <a:endParaRPr lang="en-US" dirty="0"/>
           </a:p>
@@ -8229,7 +7829,7 @@
 </p:sld>
 </file>
 
-<file path=ppt/slides/slide5.xml><?xml version="1.0" encoding="utf-8"?>
+<file path=ppt/slides/slide4.xml><?xml version="1.0" encoding="utf-8"?>
 <p:sld xmlns:a="http://schemas.openxmlformats.org/drawingml/2006/main" xmlns:r="http://schemas.openxmlformats.org/officeDocument/2006/relationships" xmlns:p="http://schemas.openxmlformats.org/presentationml/2006/main">
   <p:cSld>
     <p:spTree>
@@ -8395,7 +7995,7 @@
             <a:fld id="{294A09A9-5501-47C1-A89A-A340965A2BE2}" type="slidenum">
               <a:rPr lang="en-US" smtClean="0"/>
               <a:pPr/>
-              <a:t>5</a:t>
+              <a:t>4</a:t>
             </a:fld>
             <a:endParaRPr lang="en-US" dirty="0"/>
           </a:p>
@@ -8567,7 +8167,7 @@
 </p:sld>
 </file>
 
-<file path=ppt/slides/slide6.xml><?xml version="1.0" encoding="utf-8"?>
+<file path=ppt/slides/slide5.xml><?xml version="1.0" encoding="utf-8"?>
 <p:sld xmlns:a="http://schemas.openxmlformats.org/drawingml/2006/main" xmlns:r="http://schemas.openxmlformats.org/officeDocument/2006/relationships" xmlns:p="http://schemas.openxmlformats.org/presentationml/2006/main">
   <p:cSld>
     <p:spTree>
@@ -8733,7 +8333,7 @@
             <a:fld id="{294A09A9-5501-47C1-A89A-A340965A2BE2}" type="slidenum">
               <a:rPr lang="en-US" smtClean="0"/>
               <a:pPr/>
-              <a:t>6</a:t>
+              <a:t>5</a:t>
             </a:fld>
             <a:endParaRPr lang="en-US" dirty="0"/>
           </a:p>
@@ -8905,7 +8505,7 @@
 </p:sld>
 </file>
 
-<file path=ppt/slides/slide7.xml><?xml version="1.0" encoding="utf-8"?>
+<file path=ppt/slides/slide6.xml><?xml version="1.0" encoding="utf-8"?>
 <p:sld xmlns:a="http://schemas.openxmlformats.org/drawingml/2006/main" xmlns:r="http://schemas.openxmlformats.org/officeDocument/2006/relationships" xmlns:p="http://schemas.openxmlformats.org/presentationml/2006/main">
   <p:cSld>
     <p:spTree>
@@ -9071,7 +8671,7 @@
             <a:fld id="{294A09A9-5501-47C1-A89A-A340965A2BE2}" type="slidenum">
               <a:rPr lang="en-US" smtClean="0"/>
               <a:pPr/>
-              <a:t>7</a:t>
+              <a:t>6</a:t>
             </a:fld>
             <a:endParaRPr lang="en-US" dirty="0"/>
           </a:p>
@@ -9243,7 +8843,7 @@
 </p:sld>
 </file>
 
-<file path=ppt/slides/slide8.xml><?xml version="1.0" encoding="utf-8"?>
+<file path=ppt/slides/slide7.xml><?xml version="1.0" encoding="utf-8"?>
 <p:sld xmlns:a="http://schemas.openxmlformats.org/drawingml/2006/main" xmlns:r="http://schemas.openxmlformats.org/officeDocument/2006/relationships" xmlns:p="http://schemas.openxmlformats.org/presentationml/2006/main">
   <p:cSld>
     <p:spTree>
@@ -9529,7 +9129,7 @@
 </p:sld>
 </file>
 
-<file path=ppt/slides/slide9.xml><?xml version="1.0" encoding="utf-8"?>
+<file path=ppt/slides/slide8.xml><?xml version="1.0" encoding="utf-8"?>
 <p:sld xmlns:a="http://schemas.openxmlformats.org/drawingml/2006/main" xmlns:r="http://schemas.openxmlformats.org/officeDocument/2006/relationships" xmlns:p="http://schemas.openxmlformats.org/presentationml/2006/main">
   <p:cSld>
     <p:spTree>
@@ -9806,6 +9406,292 @@
     <p:extLst>
       <p:ext uri="{BB962C8B-B14F-4D97-AF65-F5344CB8AC3E}">
         <p14:creationId xmlns:p14="http://schemas.microsoft.com/office/powerpoint/2010/main" val="2662989866"/>
+      </p:ext>
+    </p:extLst>
+  </p:cSld>
+  <p:clrMapOvr>
+    <a:masterClrMapping/>
+  </p:clrMapOvr>
+</p:sld>
+</file>
+
+<file path=ppt/slides/slide9.xml><?xml version="1.0" encoding="utf-8"?>
+<p:sld xmlns:a="http://schemas.openxmlformats.org/drawingml/2006/main" xmlns:r="http://schemas.openxmlformats.org/officeDocument/2006/relationships" xmlns:p="http://schemas.openxmlformats.org/presentationml/2006/main">
+  <p:cSld>
+    <p:spTree>
+      <p:nvGrpSpPr>
+        <p:cNvPr id="1" name="">
+          <a:extLst>
+            <a:ext uri="{FF2B5EF4-FFF2-40B4-BE49-F238E27FC236}">
+              <a16:creationId xmlns:a16="http://schemas.microsoft.com/office/drawing/2014/main" id="{61044D96-863E-33B1-AA17-094919343D93}"/>
+            </a:ext>
+          </a:extLst>
+        </p:cNvPr>
+        <p:cNvGrpSpPr/>
+        <p:nvPr/>
+      </p:nvGrpSpPr>
+      <p:grpSpPr>
+        <a:xfrm>
+          <a:off x="0" y="0"/>
+          <a:ext cx="0" cy="0"/>
+          <a:chOff x="0" y="0"/>
+          <a:chExt cx="0" cy="0"/>
+        </a:xfrm>
+      </p:grpSpPr>
+      <p:pic>
+        <p:nvPicPr>
+          <p:cNvPr id="5" name="Picture Placeholder 4">
+            <a:extLst>
+              <a:ext uri="{FF2B5EF4-FFF2-40B4-BE49-F238E27FC236}">
+                <a16:creationId xmlns:a16="http://schemas.microsoft.com/office/drawing/2014/main" id="{EC58622B-EADE-B5AD-619F-0950249274DE}"/>
+              </a:ext>
+            </a:extLst>
+          </p:cNvPr>
+          <p:cNvPicPr>
+            <a:picLocks noGrp="1" noChangeAspect="1"/>
+          </p:cNvPicPr>
+          <p:nvPr>
+            <p:ph type="pic" sz="quarter" idx="10"/>
+          </p:nvPr>
+        </p:nvPicPr>
+        <p:blipFill>
+          <a:blip r:embed="rId2"/>
+          <a:srcRect/>
+          <a:stretch/>
+        </p:blipFill>
+        <p:spPr>
+          <a:xfrm>
+            <a:off x="0" y="0"/>
+            <a:ext cx="12192000" cy="6858000"/>
+          </a:xfrm>
+          <a:solidFill>
+            <a:schemeClr val="bg1">
+              <a:lumMod val="95000"/>
+            </a:schemeClr>
+          </a:solidFill>
+        </p:spPr>
+      </p:pic>
+      <p:sp>
+        <p:nvSpPr>
+          <p:cNvPr id="7" name="Title 6">
+            <a:extLst>
+              <a:ext uri="{FF2B5EF4-FFF2-40B4-BE49-F238E27FC236}">
+                <a16:creationId xmlns:a16="http://schemas.microsoft.com/office/drawing/2014/main" id="{2660FC99-53BB-330C-FDD0-8590C1A55E3B}"/>
+              </a:ext>
+            </a:extLst>
+          </p:cNvPr>
+          <p:cNvSpPr>
+            <a:spLocks noGrp="1"/>
+          </p:cNvSpPr>
+          <p:nvPr>
+            <p:ph type="ctrTitle"/>
+          </p:nvPr>
+        </p:nvSpPr>
+        <p:spPr>
+          <a:xfrm>
+            <a:off x="1527048" y="2276856"/>
+            <a:ext cx="9144000" cy="1508760"/>
+          </a:xfrm>
+        </p:spPr>
+        <p:txBody>
+          <a:bodyPr/>
+          <a:lstStyle/>
+          <a:p>
+            <a:r>
+              <a:rPr lang="en-US" dirty="0"/>
+              <a:t>Selecting visual aids</a:t>
+            </a:r>
+          </a:p>
+        </p:txBody>
+      </p:sp>
+      <p:sp>
+        <p:nvSpPr>
+          <p:cNvPr id="8" name="Subtitle 7">
+            <a:extLst>
+              <a:ext uri="{FF2B5EF4-FFF2-40B4-BE49-F238E27FC236}">
+                <a16:creationId xmlns:a16="http://schemas.microsoft.com/office/drawing/2014/main" id="{A18942AF-0689-DF83-5794-6FF457704B4D}"/>
+              </a:ext>
+            </a:extLst>
+          </p:cNvPr>
+          <p:cNvSpPr>
+            <a:spLocks noGrp="1"/>
+          </p:cNvSpPr>
+          <p:nvPr>
+            <p:ph type="subTitle" idx="1"/>
+          </p:nvPr>
+        </p:nvSpPr>
+        <p:spPr>
+          <a:xfrm>
+            <a:off x="1527048" y="3858768"/>
+            <a:ext cx="9144000" cy="841248"/>
+          </a:xfrm>
+        </p:spPr>
+        <p:txBody>
+          <a:bodyPr/>
+          <a:lstStyle/>
+          <a:p>
+            <a:r>
+              <a:rPr lang="en-US" dirty="0"/>
+              <a:t>Enhancing your presentation</a:t>
+            </a:r>
+          </a:p>
+        </p:txBody>
+      </p:sp>
+      <p:sp>
+        <p:nvSpPr>
+          <p:cNvPr id="12" name="Plaque 11">
+            <a:extLst>
+              <a:ext uri="{FF2B5EF4-FFF2-40B4-BE49-F238E27FC236}">
+                <a16:creationId xmlns:a16="http://schemas.microsoft.com/office/drawing/2014/main" id="{D35E6B62-C133-AFFA-16FA-69F86C75FA4B}"/>
+              </a:ext>
+              <a:ext uri="{C183D7F6-B498-43B3-948B-1728B52AA6E4}">
+                <adec:decorative xmlns:adec="http://schemas.microsoft.com/office/drawing/2017/decorative" val="1"/>
+              </a:ext>
+            </a:extLst>
+          </p:cNvPr>
+          <p:cNvSpPr/>
+          <p:nvPr/>
+        </p:nvSpPr>
+        <p:spPr>
+          <a:xfrm>
+            <a:off x="1332854" y="1782305"/>
+            <a:ext cx="9546956" cy="3270142"/>
+          </a:xfrm>
+          <a:prstGeom prst="plaque">
+            <a:avLst>
+              <a:gd name="adj" fmla="val 7602"/>
+            </a:avLst>
+          </a:prstGeom>
+          <a:noFill/>
+          <a:ln>
+            <a:solidFill>
+              <a:schemeClr val="accent5"/>
+            </a:solidFill>
+          </a:ln>
+        </p:spPr>
+        <p:style>
+          <a:lnRef idx="2">
+            <a:schemeClr val="accent1">
+              <a:shade val="15000"/>
+            </a:schemeClr>
+          </a:lnRef>
+          <a:fillRef idx="1">
+            <a:schemeClr val="accent1"/>
+          </a:fillRef>
+          <a:effectRef idx="0">
+            <a:schemeClr val="accent1"/>
+          </a:effectRef>
+          <a:fontRef idx="minor">
+            <a:schemeClr val="lt1"/>
+          </a:fontRef>
+        </p:style>
+        <p:txBody>
+          <a:bodyPr rtlCol="0" anchor="ctr"/>
+          <a:lstStyle/>
+          <a:p>
+            <a:pPr algn="ctr"/>
+            <a:endParaRPr lang="en-US" dirty="0"/>
+          </a:p>
+        </p:txBody>
+      </p:sp>
+      <p:cxnSp>
+        <p:nvCxnSpPr>
+          <p:cNvPr id="13" name="Straight Connector 12">
+            <a:extLst>
+              <a:ext uri="{FF2B5EF4-FFF2-40B4-BE49-F238E27FC236}">
+                <a16:creationId xmlns:a16="http://schemas.microsoft.com/office/drawing/2014/main" id="{0353B01D-B07D-A9BF-B408-AAAB3BF6A092}"/>
+              </a:ext>
+              <a:ext uri="{C183D7F6-B498-43B3-948B-1728B52AA6E4}">
+                <adec:decorative xmlns:adec="http://schemas.microsoft.com/office/drawing/2017/decorative" val="1"/>
+              </a:ext>
+            </a:extLst>
+          </p:cNvPr>
+          <p:cNvCxnSpPr>
+            <a:cxnSpLocks/>
+          </p:cNvCxnSpPr>
+          <p:nvPr/>
+        </p:nvCxnSpPr>
+        <p:spPr>
+          <a:xfrm>
+            <a:off x="3433949" y="3605726"/>
+            <a:ext cx="5321300" cy="0"/>
+          </a:xfrm>
+          <a:prstGeom prst="line">
+            <a:avLst/>
+          </a:prstGeom>
+          <a:ln w="12700">
+            <a:solidFill>
+              <a:schemeClr val="accent5"/>
+            </a:solidFill>
+          </a:ln>
+        </p:spPr>
+        <p:style>
+          <a:lnRef idx="1">
+            <a:schemeClr val="accent1"/>
+          </a:lnRef>
+          <a:fillRef idx="0">
+            <a:schemeClr val="accent1"/>
+          </a:fillRef>
+          <a:effectRef idx="0">
+            <a:schemeClr val="accent1"/>
+          </a:effectRef>
+          <a:fontRef idx="minor">
+            <a:schemeClr val="tx1"/>
+          </a:fontRef>
+        </p:style>
+      </p:cxnSp>
+      <p:pic>
+        <p:nvPicPr>
+          <p:cNvPr id="14" name="Picture 13">
+            <a:extLst>
+              <a:ext uri="{FF2B5EF4-FFF2-40B4-BE49-F238E27FC236}">
+                <a16:creationId xmlns:a16="http://schemas.microsoft.com/office/drawing/2014/main" id="{1B19F369-7FBB-89EC-40BB-13B92540B437}"/>
+              </a:ext>
+              <a:ext uri="{C183D7F6-B498-43B3-948B-1728B52AA6E4}">
+                <adec:decorative xmlns:adec="http://schemas.microsoft.com/office/drawing/2017/decorative" val="1"/>
+              </a:ext>
+            </a:extLst>
+          </p:cNvPr>
+          <p:cNvPicPr>
+            <a:picLocks noChangeAspect="1"/>
+          </p:cNvPicPr>
+          <p:nvPr/>
+        </p:nvPicPr>
+        <p:blipFill>
+          <a:blip r:embed="rId3" cstate="screen">
+            <a:extLst>
+              <a:ext uri="{BEBA8EAE-BF5A-486C-A8C5-ECC9F3942E4B}">
+                <a14:imgProps xmlns:a14="http://schemas.microsoft.com/office/drawing/2010/main">
+                  <a14:imgLayer r:embed="rId4">
+                    <a14:imgEffect>
+                      <a14:saturation sat="35000"/>
+                    </a14:imgEffect>
+                  </a14:imgLayer>
+                </a14:imgProps>
+              </a:ext>
+              <a:ext uri="{28A0092B-C50C-407E-A947-70E740481C1C}">
+                <a14:useLocalDpi xmlns:a14="http://schemas.microsoft.com/office/drawing/2010/main"/>
+              </a:ext>
+            </a:extLst>
+          </a:blip>
+          <a:stretch>
+            <a:fillRect/>
+          </a:stretch>
+        </p:blipFill>
+        <p:spPr>
+          <a:xfrm>
+            <a:off x="5608560" y="3464902"/>
+            <a:ext cx="972078" cy="285381"/>
+          </a:xfrm>
+          <a:prstGeom prst="rect">
+            <a:avLst/>
+          </a:prstGeom>
+        </p:spPr>
+      </p:pic>
+    </p:spTree>
+    <p:extLst>
+      <p:ext uri="{BB962C8B-B14F-4D97-AF65-F5344CB8AC3E}">
+        <p14:creationId xmlns:p14="http://schemas.microsoft.com/office/powerpoint/2010/main" val="1337771203"/>
       </p:ext>
     </p:extLst>
   </p:cSld>
@@ -10607,6 +10493,35 @@
 </file>
 
 <file path=customXml/item1.xml><?xml version="1.0" encoding="utf-8"?>
+<?mso-contentType ?>
+<FormTemplates xmlns="http://schemas.microsoft.com/sharepoint/v3/contenttype/forms">
+  <Display>DocumentLibraryForm</Display>
+  <Edit>DocumentLibraryForm</Edit>
+  <New>DocumentLibraryForm</New>
+</FormTemplates>
+</file>
+
+<file path=customXml/item2.xml><?xml version="1.0" encoding="utf-8"?>
+<p:properties xmlns:p="http://schemas.microsoft.com/office/2006/metadata/properties" xmlns:xsi="http://www.w3.org/2001/XMLSchema-instance" xmlns:pc="http://schemas.microsoft.com/office/infopath/2007/PartnerControls">
+  <documentManagement>
+    <_ip_UnifiedCompliancePolicyUIAction xmlns="http://schemas.microsoft.com/sharepoint/v3" xsi:nil="true"/>
+    <Image xmlns="71af3243-3dd4-4a8d-8c0d-dd76da1f02a5">
+      <Url xsi:nil="true"/>
+      <Description xsi:nil="true"/>
+    </Image>
+    <Status xmlns="71af3243-3dd4-4a8d-8c0d-dd76da1f02a5">Not started</Status>
+    <Background xmlns="71af3243-3dd4-4a8d-8c0d-dd76da1f02a5">false</Background>
+    <_ip_UnifiedCompliancePolicyProperties xmlns="http://schemas.microsoft.com/sharepoint/v3" xsi:nil="true"/>
+    <ImageTagsTaxHTField xmlns="71af3243-3dd4-4a8d-8c0d-dd76da1f02a5">
+      <Terms xmlns="http://schemas.microsoft.com/office/infopath/2007/PartnerControls"/>
+    </ImageTagsTaxHTField>
+    <TaxCatchAll xmlns="230e9df3-be65-4c73-a93b-d1236ebd677e" xsi:nil="true"/>
+    <MediaServiceKeyPoints xmlns="71af3243-3dd4-4a8d-8c0d-dd76da1f02a5" xsi:nil="true"/>
+  </documentManagement>
+</p:properties>
+</file>
+
+<file path=customXml/item3.xml><?xml version="1.0" encoding="utf-8"?>
 <ct:contentTypeSchema xmlns:ct="http://schemas.microsoft.com/office/2006/metadata/contentType" xmlns:ma="http://schemas.microsoft.com/office/2006/metadata/properties/metaAttributes" ct:_="" ma:_="" ma:contentTypeName="Document" ma:contentTypeID="0x01010079F111ED35F8CC479449609E8A0923A6" ma:contentTypeVersion="28" ma:contentTypeDescription="Create a new document." ma:contentTypeScope="" ma:versionID="60f5a4f2d2b0abadcf532d48ebf9cb71">
   <xsd:schema xmlns:xsd="http://www.w3.org/2001/XMLSchema" xmlns:xs="http://www.w3.org/2001/XMLSchema" xmlns:p="http://schemas.microsoft.com/office/2006/metadata/properties" xmlns:ns1="http://schemas.microsoft.com/sharepoint/v3" xmlns:ns2="71af3243-3dd4-4a8d-8c0d-dd76da1f02a5" xmlns:ns3="16c05727-aa75-4e4a-9b5f-8a80a1165891" xmlns:ns4="230e9df3-be65-4c73-a93b-d1236ebd677e" targetNamespace="http://schemas.microsoft.com/office/2006/metadata/properties" ma:root="true" ma:fieldsID="7dd78129e6a1811f84807ad11c651531" ns1:_="" ns2:_="" ns3:_="" ns4:_="">
     <xsd:import namespace="http://schemas.microsoft.com/sharepoint/v3"/>
@@ -10918,36 +10833,27 @@
 </ct:contentTypeSchema>
 </file>
 
-<file path=customXml/item2.xml><?xml version="1.0" encoding="utf-8"?>
-<p:properties xmlns:p="http://schemas.microsoft.com/office/2006/metadata/properties" xmlns:xsi="http://www.w3.org/2001/XMLSchema-instance" xmlns:pc="http://schemas.microsoft.com/office/infopath/2007/PartnerControls">
-  <documentManagement>
-    <_ip_UnifiedCompliancePolicyUIAction xmlns="http://schemas.microsoft.com/sharepoint/v3" xsi:nil="true"/>
-    <Image xmlns="71af3243-3dd4-4a8d-8c0d-dd76da1f02a5">
-      <Url xsi:nil="true"/>
-      <Description xsi:nil="true"/>
-    </Image>
-    <Status xmlns="71af3243-3dd4-4a8d-8c0d-dd76da1f02a5">Not started</Status>
-    <Background xmlns="71af3243-3dd4-4a8d-8c0d-dd76da1f02a5">false</Background>
-    <_ip_UnifiedCompliancePolicyProperties xmlns="http://schemas.microsoft.com/sharepoint/v3" xsi:nil="true"/>
-    <ImageTagsTaxHTField xmlns="71af3243-3dd4-4a8d-8c0d-dd76da1f02a5">
-      <Terms xmlns="http://schemas.microsoft.com/office/infopath/2007/PartnerControls"/>
-    </ImageTagsTaxHTField>
-    <TaxCatchAll xmlns="230e9df3-be65-4c73-a93b-d1236ebd677e" xsi:nil="true"/>
-    <MediaServiceKeyPoints xmlns="71af3243-3dd4-4a8d-8c0d-dd76da1f02a5" xsi:nil="true"/>
-  </documentManagement>
-</p:properties>
+<file path=customXml/itemProps1.xml><?xml version="1.0" encoding="utf-8"?>
+<ds:datastoreItem xmlns:ds="http://schemas.openxmlformats.org/officeDocument/2006/customXml" ds:itemID="{19915FD3-F777-4046-A12C-BE3860E324BC}">
+  <ds:schemaRefs>
+    <ds:schemaRef ds:uri="http://schemas.microsoft.com/sharepoint/v3/contenttype/forms"/>
+  </ds:schemaRefs>
+</ds:datastoreItem>
 </file>
 
-<file path=customXml/item3.xml><?xml version="1.0" encoding="utf-8"?>
-<?mso-contentType ?>
-<FormTemplates xmlns="http://schemas.microsoft.com/sharepoint/v3/contenttype/forms">
-  <Display>DocumentLibraryForm</Display>
-  <Edit>DocumentLibraryForm</Edit>
-  <New>DocumentLibraryForm</New>
-</FormTemplates>
+<file path=customXml/itemProps2.xml><?xml version="1.0" encoding="utf-8"?>
+<ds:datastoreItem xmlns:ds="http://schemas.openxmlformats.org/officeDocument/2006/customXml" ds:itemID="{A384BFC8-02DA-464F-AE97-4951BE47415C}">
+  <ds:schemaRefs>
+    <ds:schemaRef ds:uri="http://schemas.microsoft.com/office/2006/metadata/properties"/>
+    <ds:schemaRef ds:uri="http://schemas.microsoft.com/office/infopath/2007/PartnerControls"/>
+    <ds:schemaRef ds:uri="http://schemas.microsoft.com/sharepoint/v3"/>
+    <ds:schemaRef ds:uri="71af3243-3dd4-4a8d-8c0d-dd76da1f02a5"/>
+    <ds:schemaRef ds:uri="230e9df3-be65-4c73-a93b-d1236ebd677e"/>
+  </ds:schemaRefs>
+</ds:datastoreItem>
 </file>
 
-<file path=customXml/itemProps1.xml><?xml version="1.0" encoding="utf-8"?>
+<file path=customXml/itemProps3.xml><?xml version="1.0" encoding="utf-8"?>
 <ds:datastoreItem xmlns:ds="http://schemas.openxmlformats.org/officeDocument/2006/customXml" ds:itemID="{71E6BC5B-F32E-483D-A6CB-100D6BCB78C4}">
   <ds:schemaRefs>
     <ds:schemaRef ds:uri="http://schemas.microsoft.com/office/2006/metadata/contentType"/>
@@ -10968,26 +10874,6 @@
 </ds:datastoreItem>
 </file>
 
-<file path=customXml/itemProps2.xml><?xml version="1.0" encoding="utf-8"?>
-<ds:datastoreItem xmlns:ds="http://schemas.openxmlformats.org/officeDocument/2006/customXml" ds:itemID="{A384BFC8-02DA-464F-AE97-4951BE47415C}">
-  <ds:schemaRefs>
-    <ds:schemaRef ds:uri="http://schemas.microsoft.com/office/2006/metadata/properties"/>
-    <ds:schemaRef ds:uri="http://schemas.microsoft.com/office/infopath/2007/PartnerControls"/>
-    <ds:schemaRef ds:uri="http://schemas.microsoft.com/sharepoint/v3"/>
-    <ds:schemaRef ds:uri="71af3243-3dd4-4a8d-8c0d-dd76da1f02a5"/>
-    <ds:schemaRef ds:uri="230e9df3-be65-4c73-a93b-d1236ebd677e"/>
-  </ds:schemaRefs>
-</ds:datastoreItem>
-</file>
-
-<file path=customXml/itemProps3.xml><?xml version="1.0" encoding="utf-8"?>
-<ds:datastoreItem xmlns:ds="http://schemas.openxmlformats.org/officeDocument/2006/customXml" ds:itemID="{19915FD3-F777-4046-A12C-BE3860E324BC}">
-  <ds:schemaRefs>
-    <ds:schemaRef ds:uri="http://schemas.microsoft.com/sharepoint/v3/contenttype/forms"/>
-  </ds:schemaRefs>
-</ds:datastoreItem>
-</file>
-
 <file path=docMetadata/LabelInfo.xml><?xml version="1.0" encoding="utf-8"?>
 <clbl:labelList xmlns:clbl="http://schemas.microsoft.com/office/2020/mipLabelMetadata"/>
 </file>
</xml_diff>